<commit_message>
Final cleanup: Consolidate READMEs, add SUBMISSION_GUIDE_FOR_JUDGES.txt, move ZIP to artifacts/, add Google Drive link to PowerPoint, exclude artifacts/scripts from ZIP
</commit_message>
<xml_diff>
--- a/presentation/10Alytics_Governance_Growth_Gap.pptx
+++ b/presentation/10Alytics_Governance_Growth_Gap.pptx
@@ -4021,8 +4021,8 @@
         </p:nvSpPr>
         <p:spPr>
           <a:xfrm>
-            <a:off x="914400" y="6858000"/>
-            <a:ext cx="12801600" cy="457200"/>
+            <a:off x="457200" y="5943600"/>
+            <a:ext cx="8229600" cy="914400"/>
           </a:xfrm>
           <a:prstGeom prst="rect">
             <a:avLst/>
@@ -4030,63 +4030,38 @@
           <a:noFill/>
         </p:spPr>
         <p:txBody>
-          <a:bodyPr wrap="none">
-            <a:spAutoFit/>
-          </a:bodyPr>
-          <a:lstStyle/>
-          <a:p>
-            <a:pPr algn="ctr">
-              <a:defRPr sz="1600" i="1">
-                <a:solidFill>
-                  <a:srgbClr val="7F7F7F"/>
-                </a:solidFill>
-              </a:defRPr>
-            </a:pPr>
-            <a:r>
-              <a:t>10Alytics Global Hackathon 2025 | November 29, 2025</a:t>
-            </a:r>
-          </a:p>
-        </p:txBody>
-      </p:sp>
-      <p:sp>
-        <p:nvSpPr>
-          <p:cNvPr id="5" name="TextBox 4"/>
-          <p:cNvSpPr txBox="1"/>
-          <p:nvPr/>
-        </p:nvSpPr>
-        <p:spPr>
-          <a:xfrm>
-            <a:off x="457200" y="5943600"/>
-            <a:ext cx="8229600" cy="731520"/>
-          </a:xfrm>
-          <a:prstGeom prst="rect">
-            <a:avLst/>
-          </a:prstGeom>
-          <a:noFill/>
-        </p:spPr>
-        <p:txBody>
           <a:bodyPr wrap="square">
             <a:spAutoFit/>
           </a:bodyPr>
           <a:lstStyle/>
           <a:p>
             <a:pPr algn="ctr">
-              <a:defRPr sz="1000">
+              <a:defRPr sz="1100" b="1">
                 <a:latin typeface="Calibri"/>
               </a:defRPr>
             </a:pPr>
             <a:r>
-              <a:t>📦 Complete Submission: GitHub (Live Code) + ZIP (All Files - Extract to View)</a:t>
+              <a:t>📦 Full Submission Package (ZIP - 13MB - Please Extract)</a:t>
             </a:r>
           </a:p>
           <a:p>
             <a:pPr algn="ctr">
-              <a:defRPr sz="900" b="1">
+              <a:defRPr sz="900">
                 <a:latin typeface="Calibri"/>
               </a:defRPr>
             </a:pPr>
             <a:r>
-              <a:t>https://github.com/Basit-Balogun10/africa-governance-growth-gap-analysis</a:t>
+              <a:t>https://drive.google.com/file/d/1lhvmFr-v9KLngbqpYUu3as_HXbGbfULp/view?usp=drivesdk</a:t>
+            </a:r>
+          </a:p>
+          <a:p>
+            <a:pPr algn="ctr">
+              <a:defRPr sz="800">
+                <a:latin typeface="Calibri"/>
+              </a:defRPr>
+            </a:pPr>
+            <a:r>
+              <a:t>GitHub: https://github.com/Basit-Balogun10/africa-governance-growth-gap-analysis</a:t>
             </a:r>
           </a:p>
         </p:txBody>
@@ -5168,7 +5143,7 @@
         <p:spPr>
           <a:xfrm>
             <a:off x="457200" y="5486400"/>
-            <a:ext cx="8229600" cy="731520"/>
+            <a:ext cx="8229600" cy="1097280"/>
           </a:xfrm>
           <a:prstGeom prst="rect">
             <a:avLst/>
@@ -5182,22 +5157,42 @@
           <a:lstStyle/>
           <a:p>
             <a:pPr algn="ctr">
-              <a:defRPr sz="1000">
+              <a:defRPr sz="1100" b="1">
                 <a:latin typeface="Calibri"/>
               </a:defRPr>
             </a:pPr>
             <a:r>
-              <a:t>📦 Full Submission ZIP (13MB - Please Extract): See repo or contact basitbalogun10@gmail.com</a:t>
+              <a:t>📦 Full Working Files Submission (ZIP - 13MB - Extract Required)</a:t>
             </a:r>
           </a:p>
           <a:p>
             <a:pPr algn="ctr">
-              <a:defRPr sz="900" b="1">
+              <a:defRPr sz="900">
                 <a:latin typeface="Calibri"/>
               </a:defRPr>
             </a:pPr>
             <a:r>
-              <a:t>GitHub: https://github.com/Basit-Balogun10/africa-governance-growth-gap-analysis</a:t>
+              <a:t>Google Drive: https://drive.google.com/file/d/1lhvmFr-v9KLngbqpYUu3as_HXbGbfULp/view?usp=drivesdk</a:t>
+            </a:r>
+          </a:p>
+          <a:p>
+            <a:pPr algn="ctr">
+              <a:defRPr sz="800">
+                <a:latin typeface="Calibri"/>
+              </a:defRPr>
+            </a:pPr>
+            <a:r>
+              <a:t>GitHub Repo: https://github.com/Basit-Balogun10/africa-governance-growth-gap-analysis</a:t>
+            </a:r>
+          </a:p>
+          <a:p>
+            <a:pPr algn="ctr">
+              <a:defRPr sz="900">
+                <a:latin typeface="Calibri"/>
+              </a:defRPr>
+            </a:pPr>
+            <a:r>
+              <a:t>Email: basitbalogun10@gmail.com</a:t>
             </a:r>
           </a:p>
         </p:txBody>

</xml_diff>